<commit_message>
Adds minor modification to RASD presentation
</commit_message>
<xml_diff>
--- a/DELIVERIES/RASD_Delivery_Presentation.pptx
+++ b/DELIVERIES/RASD_Delivery_Presentation.pptx
@@ -209,7 +209,8 @@
           <a:p>
             <a:fld id="{6A0661FD-58B4-4E28-B749-D439AF71AE8F}" type="datetimeFigureOut">
               <a:rPr lang="it-IT" smtClean="0"/>
-              <a:t>14/11/2016</a:t>
+              <a:pPr/>
+              <a:t>15/11/2016</a:t>
             </a:fld>
             <a:endParaRPr lang="it-IT"/>
           </a:p>
@@ -370,6 +371,7 @@
           <a:p>
             <a:fld id="{B889F9B7-D8EA-43D7-9911-D1A82DF6B0BA}" type="slidenum">
               <a:rPr lang="it-IT" smtClean="0"/>
+              <a:pPr/>
               <a:t>‹N›</a:t>
             </a:fld>
             <a:endParaRPr lang="it-IT"/>
@@ -581,6 +583,7 @@
           <a:p>
             <a:fld id="{B889F9B7-D8EA-43D7-9911-D1A82DF6B0BA}" type="slidenum">
               <a:rPr lang="it-IT" smtClean="0"/>
+              <a:pPr/>
               <a:t>10</a:t>
             </a:fld>
             <a:endParaRPr lang="it-IT"/>
@@ -682,6 +685,7 @@
           <a:p>
             <a:fld id="{B889F9B7-D8EA-43D7-9911-D1A82DF6B0BA}" type="slidenum">
               <a:rPr lang="it-IT" smtClean="0"/>
+              <a:pPr/>
               <a:t>13</a:t>
             </a:fld>
             <a:endParaRPr lang="it-IT"/>
@@ -802,6 +806,7 @@
           <a:p>
             <a:fld id="{B889F9B7-D8EA-43D7-9911-D1A82DF6B0BA}" type="slidenum">
               <a:rPr lang="it-IT" smtClean="0"/>
+              <a:pPr/>
               <a:t>14</a:t>
             </a:fld>
             <a:endParaRPr lang="it-IT"/>
@@ -926,6 +931,7 @@
           <a:p>
             <a:fld id="{B889F9B7-D8EA-43D7-9911-D1A82DF6B0BA}" type="slidenum">
               <a:rPr lang="it-IT" smtClean="0"/>
+              <a:pPr/>
               <a:t>15</a:t>
             </a:fld>
             <a:endParaRPr lang="it-IT"/>
@@ -1031,6 +1037,7 @@
           <a:p>
             <a:fld id="{B889F9B7-D8EA-43D7-9911-D1A82DF6B0BA}" type="slidenum">
               <a:rPr lang="it-IT" smtClean="0"/>
+              <a:pPr/>
               <a:t>16</a:t>
             </a:fld>
             <a:endParaRPr lang="it-IT"/>
@@ -1164,6 +1171,7 @@
           <a:p>
             <a:fld id="{B889F9B7-D8EA-43D7-9911-D1A82DF6B0BA}" type="slidenum">
               <a:rPr lang="it-IT" smtClean="0"/>
+              <a:pPr/>
               <a:t>17</a:t>
             </a:fld>
             <a:endParaRPr lang="it-IT"/>
@@ -1266,6 +1274,7 @@
           <a:p>
             <a:fld id="{B889F9B7-D8EA-43D7-9911-D1A82DF6B0BA}" type="slidenum">
               <a:rPr lang="it-IT" smtClean="0"/>
+              <a:pPr/>
               <a:t>18</a:t>
             </a:fld>
             <a:endParaRPr lang="it-IT"/>
@@ -1461,7 +1470,8 @@
           <a:p>
             <a:fld id="{BDB0EAEF-8CC9-47D2-BE57-58FC6F3AB6F8}" type="datetimeFigureOut">
               <a:rPr lang="it-IT" smtClean="0"/>
-              <a:t>14/11/2016</a:t>
+              <a:pPr/>
+              <a:t>15/11/2016</a:t>
             </a:fld>
             <a:endParaRPr lang="it-IT"/>
           </a:p>
@@ -1503,6 +1513,7 @@
           <a:p>
             <a:fld id="{E342EE78-CC29-4ECA-926F-8793D1368ADC}" type="slidenum">
               <a:rPr lang="it-IT" smtClean="0"/>
+              <a:pPr/>
               <a:t>‹N›</a:t>
             </a:fld>
             <a:endParaRPr lang="it-IT"/>
@@ -1626,7 +1637,8 @@
           <a:p>
             <a:fld id="{BDB0EAEF-8CC9-47D2-BE57-58FC6F3AB6F8}" type="datetimeFigureOut">
               <a:rPr lang="it-IT" smtClean="0"/>
-              <a:t>14/11/2016</a:t>
+              <a:pPr/>
+              <a:t>15/11/2016</a:t>
             </a:fld>
             <a:endParaRPr lang="it-IT"/>
           </a:p>
@@ -1668,6 +1680,7 @@
           <a:p>
             <a:fld id="{E342EE78-CC29-4ECA-926F-8793D1368ADC}" type="slidenum">
               <a:rPr lang="it-IT" smtClean="0"/>
+              <a:pPr/>
               <a:t>‹N›</a:t>
             </a:fld>
             <a:endParaRPr lang="it-IT"/>
@@ -1801,7 +1814,8 @@
           <a:p>
             <a:fld id="{BDB0EAEF-8CC9-47D2-BE57-58FC6F3AB6F8}" type="datetimeFigureOut">
               <a:rPr lang="it-IT" smtClean="0"/>
-              <a:t>14/11/2016</a:t>
+              <a:pPr/>
+              <a:t>15/11/2016</a:t>
             </a:fld>
             <a:endParaRPr lang="it-IT"/>
           </a:p>
@@ -1843,6 +1857,7 @@
           <a:p>
             <a:fld id="{E342EE78-CC29-4ECA-926F-8793D1368ADC}" type="slidenum">
               <a:rPr lang="it-IT" smtClean="0"/>
+              <a:pPr/>
               <a:t>‹N›</a:t>
             </a:fld>
             <a:endParaRPr lang="it-IT"/>
@@ -1966,7 +1981,8 @@
           <a:p>
             <a:fld id="{BDB0EAEF-8CC9-47D2-BE57-58FC6F3AB6F8}" type="datetimeFigureOut">
               <a:rPr lang="it-IT" smtClean="0"/>
-              <a:t>14/11/2016</a:t>
+              <a:pPr/>
+              <a:t>15/11/2016</a:t>
             </a:fld>
             <a:endParaRPr lang="it-IT"/>
           </a:p>
@@ -2008,6 +2024,7 @@
           <a:p>
             <a:fld id="{E342EE78-CC29-4ECA-926F-8793D1368ADC}" type="slidenum">
               <a:rPr lang="it-IT" smtClean="0"/>
+              <a:pPr/>
               <a:t>‹N›</a:t>
             </a:fld>
             <a:endParaRPr lang="it-IT"/>
@@ -2207,7 +2224,8 @@
           <a:p>
             <a:fld id="{BDB0EAEF-8CC9-47D2-BE57-58FC6F3AB6F8}" type="datetimeFigureOut">
               <a:rPr lang="it-IT" smtClean="0"/>
-              <a:t>14/11/2016</a:t>
+              <a:pPr/>
+              <a:t>15/11/2016</a:t>
             </a:fld>
             <a:endParaRPr lang="it-IT"/>
           </a:p>
@@ -2249,6 +2267,7 @@
           <a:p>
             <a:fld id="{E342EE78-CC29-4ECA-926F-8793D1368ADC}" type="slidenum">
               <a:rPr lang="it-IT" smtClean="0"/>
+              <a:pPr/>
               <a:t>‹N›</a:t>
             </a:fld>
             <a:endParaRPr lang="it-IT"/>
@@ -2490,7 +2509,8 @@
           <a:p>
             <a:fld id="{BDB0EAEF-8CC9-47D2-BE57-58FC6F3AB6F8}" type="datetimeFigureOut">
               <a:rPr lang="it-IT" smtClean="0"/>
-              <a:t>14/11/2016</a:t>
+              <a:pPr/>
+              <a:t>15/11/2016</a:t>
             </a:fld>
             <a:endParaRPr lang="it-IT"/>
           </a:p>
@@ -2532,6 +2552,7 @@
           <a:p>
             <a:fld id="{E342EE78-CC29-4ECA-926F-8793D1368ADC}" type="slidenum">
               <a:rPr lang="it-IT" smtClean="0"/>
+              <a:pPr/>
               <a:t>‹N›</a:t>
             </a:fld>
             <a:endParaRPr lang="it-IT"/>
@@ -2907,7 +2928,8 @@
           <a:p>
             <a:fld id="{BDB0EAEF-8CC9-47D2-BE57-58FC6F3AB6F8}" type="datetimeFigureOut">
               <a:rPr lang="it-IT" smtClean="0"/>
-              <a:t>14/11/2016</a:t>
+              <a:pPr/>
+              <a:t>15/11/2016</a:t>
             </a:fld>
             <a:endParaRPr lang="it-IT"/>
           </a:p>
@@ -2949,6 +2971,7 @@
           <a:p>
             <a:fld id="{E342EE78-CC29-4ECA-926F-8793D1368ADC}" type="slidenum">
               <a:rPr lang="it-IT" smtClean="0"/>
+              <a:pPr/>
               <a:t>‹N›</a:t>
             </a:fld>
             <a:endParaRPr lang="it-IT"/>
@@ -3020,7 +3043,8 @@
           <a:p>
             <a:fld id="{BDB0EAEF-8CC9-47D2-BE57-58FC6F3AB6F8}" type="datetimeFigureOut">
               <a:rPr lang="it-IT" smtClean="0"/>
-              <a:t>14/11/2016</a:t>
+              <a:pPr/>
+              <a:t>15/11/2016</a:t>
             </a:fld>
             <a:endParaRPr lang="it-IT"/>
           </a:p>
@@ -3062,6 +3086,7 @@
           <a:p>
             <a:fld id="{E342EE78-CC29-4ECA-926F-8793D1368ADC}" type="slidenum">
               <a:rPr lang="it-IT" smtClean="0"/>
+              <a:pPr/>
               <a:t>‹N›</a:t>
             </a:fld>
             <a:endParaRPr lang="it-IT"/>
@@ -3110,7 +3135,8 @@
           <a:p>
             <a:fld id="{BDB0EAEF-8CC9-47D2-BE57-58FC6F3AB6F8}" type="datetimeFigureOut">
               <a:rPr lang="it-IT" smtClean="0"/>
-              <a:t>14/11/2016</a:t>
+              <a:pPr/>
+              <a:t>15/11/2016</a:t>
             </a:fld>
             <a:endParaRPr lang="it-IT"/>
           </a:p>
@@ -3152,6 +3178,7 @@
           <a:p>
             <a:fld id="{E342EE78-CC29-4ECA-926F-8793D1368ADC}" type="slidenum">
               <a:rPr lang="it-IT" smtClean="0"/>
+              <a:pPr/>
               <a:t>‹N›</a:t>
             </a:fld>
             <a:endParaRPr lang="it-IT"/>
@@ -3382,7 +3409,8 @@
           <a:p>
             <a:fld id="{BDB0EAEF-8CC9-47D2-BE57-58FC6F3AB6F8}" type="datetimeFigureOut">
               <a:rPr lang="it-IT" smtClean="0"/>
-              <a:t>14/11/2016</a:t>
+              <a:pPr/>
+              <a:t>15/11/2016</a:t>
             </a:fld>
             <a:endParaRPr lang="it-IT"/>
           </a:p>
@@ -3424,6 +3452,7 @@
           <a:p>
             <a:fld id="{E342EE78-CC29-4ECA-926F-8793D1368ADC}" type="slidenum">
               <a:rPr lang="it-IT" smtClean="0"/>
+              <a:pPr/>
               <a:t>‹N›</a:t>
             </a:fld>
             <a:endParaRPr lang="it-IT"/>
@@ -3630,7 +3659,8 @@
           <a:p>
             <a:fld id="{BDB0EAEF-8CC9-47D2-BE57-58FC6F3AB6F8}" type="datetimeFigureOut">
               <a:rPr lang="it-IT" smtClean="0"/>
-              <a:t>14/11/2016</a:t>
+              <a:pPr/>
+              <a:t>15/11/2016</a:t>
             </a:fld>
             <a:endParaRPr lang="it-IT"/>
           </a:p>
@@ -3672,6 +3702,7 @@
           <a:p>
             <a:fld id="{E342EE78-CC29-4ECA-926F-8793D1368ADC}" type="slidenum">
               <a:rPr lang="it-IT" smtClean="0"/>
+              <a:pPr/>
               <a:t>‹N›</a:t>
             </a:fld>
             <a:endParaRPr lang="it-IT"/>
@@ -3838,7 +3869,8 @@
           <a:p>
             <a:fld id="{BDB0EAEF-8CC9-47D2-BE57-58FC6F3AB6F8}" type="datetimeFigureOut">
               <a:rPr lang="it-IT" smtClean="0"/>
-              <a:t>14/11/2016</a:t>
+              <a:pPr/>
+              <a:t>15/11/2016</a:t>
             </a:fld>
             <a:endParaRPr lang="it-IT"/>
           </a:p>
@@ -3916,6 +3948,7 @@
           <a:p>
             <a:fld id="{E342EE78-CC29-4ECA-926F-8793D1368ADC}" type="slidenum">
               <a:rPr lang="it-IT" smtClean="0"/>
+              <a:pPr/>
               <a:t>‹N›</a:t>
             </a:fld>
             <a:endParaRPr lang="it-IT"/>
@@ -6519,54 +6552,6 @@
       </p:sp>
       <p:sp>
         <p:nvSpPr>
-          <p:cNvPr id="75" name="Connettore 74"/>
-          <p:cNvSpPr/>
-          <p:nvPr/>
-        </p:nvSpPr>
-        <p:spPr>
-          <a:xfrm>
-            <a:off x="2339752" y="3825056"/>
-            <a:ext cx="108000" cy="108000"/>
-          </a:xfrm>
-          <a:prstGeom prst="flowChartConnector">
-            <a:avLst/>
-          </a:prstGeom>
-          <a:solidFill>
-            <a:schemeClr val="tx1"/>
-          </a:solidFill>
-          <a:ln>
-            <a:solidFill>
-              <a:schemeClr val="tx1"/>
-            </a:solidFill>
-          </a:ln>
-        </p:spPr>
-        <p:style>
-          <a:lnRef idx="2">
-            <a:schemeClr val="accent1">
-              <a:shade val="50000"/>
-            </a:schemeClr>
-          </a:lnRef>
-          <a:fillRef idx="1">
-            <a:schemeClr val="accent1"/>
-          </a:fillRef>
-          <a:effectRef idx="0">
-            <a:schemeClr val="accent1"/>
-          </a:effectRef>
-          <a:fontRef idx="minor">
-            <a:schemeClr val="lt1"/>
-          </a:fontRef>
-        </p:style>
-        <p:txBody>
-          <a:bodyPr rtlCol="0" anchor="ctr"/>
-          <a:lstStyle/>
-          <a:p>
-            <a:pPr algn="ctr"/>
-            <a:endParaRPr lang="it-IT"/>
-          </a:p>
-        </p:txBody>
-      </p:sp>
-      <p:sp>
-        <p:nvSpPr>
           <p:cNvPr id="76" name="Connettore 75"/>
           <p:cNvSpPr/>
           <p:nvPr/>
@@ -6894,116 +6879,6 @@
           <a:xfrm flipH="1">
             <a:off x="2008260" y="3948872"/>
             <a:ext cx="1395796" cy="1725150"/>
-          </a:xfrm>
-          <a:prstGeom prst="line">
-            <a:avLst/>
-          </a:prstGeom>
-        </p:spPr>
-        <p:style>
-          <a:lnRef idx="1">
-            <a:schemeClr val="dk1"/>
-          </a:lnRef>
-          <a:fillRef idx="0">
-            <a:schemeClr val="dk1"/>
-          </a:fillRef>
-          <a:effectRef idx="0">
-            <a:schemeClr val="dk1"/>
-          </a:effectRef>
-          <a:fontRef idx="minor">
-            <a:schemeClr val="tx1"/>
-          </a:fontRef>
-        </p:style>
-      </p:cxnSp>
-      <p:sp>
-        <p:nvSpPr>
-          <p:cNvPr id="88" name="CasellaDiTesto 87"/>
-          <p:cNvSpPr txBox="1"/>
-          <p:nvPr/>
-        </p:nvSpPr>
-        <p:spPr>
-          <a:xfrm>
-            <a:off x="126963" y="4222829"/>
-            <a:ext cx="1996765" cy="646331"/>
-          </a:xfrm>
-          <a:prstGeom prst="rect">
-            <a:avLst/>
-          </a:prstGeom>
-          <a:noFill/>
-        </p:spPr>
-        <p:txBody>
-          <a:bodyPr wrap="none" rtlCol="0">
-            <a:spAutoFit/>
-          </a:bodyPr>
-          <a:lstStyle/>
-          <a:p>
-            <a:r>
-              <a:rPr lang="it-IT" dirty="0" err="1"/>
-              <a:t>u</a:t>
-            </a:r>
-            <a:r>
-              <a:rPr lang="it-IT" dirty="0" err="1" smtClean="0"/>
-              <a:t>ser</a:t>
-            </a:r>
-            <a:r>
-              <a:rPr lang="it-IT" dirty="0" smtClean="0"/>
-              <a:t> </a:t>
-            </a:r>
-            <a:r>
-              <a:rPr lang="it-IT" dirty="0" err="1" smtClean="0"/>
-              <a:t>plugs</a:t>
-            </a:r>
-            <a:r>
-              <a:rPr lang="it-IT" dirty="0" smtClean="0"/>
-              <a:t> </a:t>
-            </a:r>
-            <a:r>
-              <a:rPr lang="it-IT" dirty="0" err="1" smtClean="0"/>
-              <a:t>car</a:t>
-            </a:r>
-            <a:endParaRPr lang="it-IT" dirty="0" smtClean="0"/>
-          </a:p>
-          <a:p>
-            <a:r>
-              <a:rPr lang="it-IT" dirty="0" err="1"/>
-              <a:t>i</a:t>
-            </a:r>
-            <a:r>
-              <a:rPr lang="it-IT" dirty="0" err="1" smtClean="0"/>
-              <a:t>nto</a:t>
-            </a:r>
-            <a:r>
-              <a:rPr lang="it-IT" dirty="0" smtClean="0"/>
-              <a:t> the </a:t>
-            </a:r>
-            <a:r>
-              <a:rPr lang="it-IT" dirty="0" err="1" smtClean="0"/>
-              <a:t>power</a:t>
-            </a:r>
-            <a:r>
-              <a:rPr lang="it-IT" dirty="0" smtClean="0"/>
-              <a:t> </a:t>
-            </a:r>
-            <a:r>
-              <a:rPr lang="it-IT" dirty="0" err="1" smtClean="0"/>
-              <a:t>grid</a:t>
-            </a:r>
-            <a:endParaRPr lang="it-IT" dirty="0"/>
-          </a:p>
-        </p:txBody>
-      </p:sp>
-      <p:cxnSp>
-        <p:nvCxnSpPr>
-          <p:cNvPr id="90" name="Connettore 1 89"/>
-          <p:cNvCxnSpPr>
-            <a:stCxn id="75" idx="7"/>
-            <a:endCxn id="88" idx="0"/>
-          </p:cNvCxnSpPr>
-          <p:nvPr/>
-        </p:nvCxnSpPr>
-        <p:spPr>
-          <a:xfrm flipH="1">
-            <a:off x="1125346" y="3840872"/>
-            <a:ext cx="1306590" cy="381957"/>
           </a:xfrm>
           <a:prstGeom prst="line">
             <a:avLst/>
@@ -12621,54 +12496,6 @@
       </p:sp>
       <p:sp>
         <p:nvSpPr>
-          <p:cNvPr id="84" name="Connettore 83"/>
-          <p:cNvSpPr/>
-          <p:nvPr/>
-        </p:nvSpPr>
-        <p:spPr>
-          <a:xfrm>
-            <a:off x="2339752" y="3825056"/>
-            <a:ext cx="108000" cy="108000"/>
-          </a:xfrm>
-          <a:prstGeom prst="flowChartConnector">
-            <a:avLst/>
-          </a:prstGeom>
-          <a:solidFill>
-            <a:schemeClr val="tx1"/>
-          </a:solidFill>
-          <a:ln>
-            <a:solidFill>
-              <a:schemeClr val="tx1"/>
-            </a:solidFill>
-          </a:ln>
-        </p:spPr>
-        <p:style>
-          <a:lnRef idx="2">
-            <a:schemeClr val="accent1">
-              <a:shade val="50000"/>
-            </a:schemeClr>
-          </a:lnRef>
-          <a:fillRef idx="1">
-            <a:schemeClr val="accent1"/>
-          </a:fillRef>
-          <a:effectRef idx="0">
-            <a:schemeClr val="accent1"/>
-          </a:effectRef>
-          <a:fontRef idx="minor">
-            <a:schemeClr val="lt1"/>
-          </a:fontRef>
-        </p:style>
-        <p:txBody>
-          <a:bodyPr rtlCol="0" anchor="ctr"/>
-          <a:lstStyle/>
-          <a:p>
-            <a:pPr algn="ctr"/>
-            <a:endParaRPr lang="it-IT"/>
-          </a:p>
-        </p:txBody>
-      </p:sp>
-      <p:sp>
-        <p:nvSpPr>
           <p:cNvPr id="85" name="Connettore 84"/>
           <p:cNvSpPr/>
           <p:nvPr/>
@@ -12996,116 +12823,6 @@
           <a:xfrm flipH="1">
             <a:off x="2008260" y="3948872"/>
             <a:ext cx="1395796" cy="1725150"/>
-          </a:xfrm>
-          <a:prstGeom prst="line">
-            <a:avLst/>
-          </a:prstGeom>
-        </p:spPr>
-        <p:style>
-          <a:lnRef idx="1">
-            <a:schemeClr val="dk1"/>
-          </a:lnRef>
-          <a:fillRef idx="0">
-            <a:schemeClr val="dk1"/>
-          </a:fillRef>
-          <a:effectRef idx="0">
-            <a:schemeClr val="dk1"/>
-          </a:effectRef>
-          <a:fontRef idx="minor">
-            <a:schemeClr val="tx1"/>
-          </a:fontRef>
-        </p:style>
-      </p:cxnSp>
-      <p:sp>
-        <p:nvSpPr>
-          <p:cNvPr id="93" name="CasellaDiTesto 92"/>
-          <p:cNvSpPr txBox="1"/>
-          <p:nvPr/>
-        </p:nvSpPr>
-        <p:spPr>
-          <a:xfrm>
-            <a:off x="126963" y="4222829"/>
-            <a:ext cx="1996765" cy="646331"/>
-          </a:xfrm>
-          <a:prstGeom prst="rect">
-            <a:avLst/>
-          </a:prstGeom>
-          <a:noFill/>
-        </p:spPr>
-        <p:txBody>
-          <a:bodyPr wrap="none" rtlCol="0">
-            <a:spAutoFit/>
-          </a:bodyPr>
-          <a:lstStyle/>
-          <a:p>
-            <a:r>
-              <a:rPr lang="it-IT" dirty="0" err="1"/>
-              <a:t>u</a:t>
-            </a:r>
-            <a:r>
-              <a:rPr lang="it-IT" dirty="0" err="1" smtClean="0"/>
-              <a:t>ser</a:t>
-            </a:r>
-            <a:r>
-              <a:rPr lang="it-IT" dirty="0" smtClean="0"/>
-              <a:t> </a:t>
-            </a:r>
-            <a:r>
-              <a:rPr lang="it-IT" dirty="0" err="1" smtClean="0"/>
-              <a:t>plugs</a:t>
-            </a:r>
-            <a:r>
-              <a:rPr lang="it-IT" dirty="0" smtClean="0"/>
-              <a:t> </a:t>
-            </a:r>
-            <a:r>
-              <a:rPr lang="it-IT" dirty="0" err="1" smtClean="0"/>
-              <a:t>car</a:t>
-            </a:r>
-            <a:endParaRPr lang="it-IT" dirty="0" smtClean="0"/>
-          </a:p>
-          <a:p>
-            <a:r>
-              <a:rPr lang="it-IT" dirty="0" err="1"/>
-              <a:t>i</a:t>
-            </a:r>
-            <a:r>
-              <a:rPr lang="it-IT" dirty="0" err="1" smtClean="0"/>
-              <a:t>nto</a:t>
-            </a:r>
-            <a:r>
-              <a:rPr lang="it-IT" dirty="0" smtClean="0"/>
-              <a:t> the </a:t>
-            </a:r>
-            <a:r>
-              <a:rPr lang="it-IT" dirty="0" err="1" smtClean="0"/>
-              <a:t>power</a:t>
-            </a:r>
-            <a:r>
-              <a:rPr lang="it-IT" dirty="0" smtClean="0"/>
-              <a:t> </a:t>
-            </a:r>
-            <a:r>
-              <a:rPr lang="it-IT" dirty="0" err="1" smtClean="0"/>
-              <a:t>grid</a:t>
-            </a:r>
-            <a:endParaRPr lang="it-IT" dirty="0"/>
-          </a:p>
-        </p:txBody>
-      </p:sp>
-      <p:cxnSp>
-        <p:nvCxnSpPr>
-          <p:cNvPr id="94" name="Connettore 1 93"/>
-          <p:cNvCxnSpPr>
-            <a:stCxn id="84" idx="7"/>
-            <a:endCxn id="93" idx="0"/>
-          </p:cNvCxnSpPr>
-          <p:nvPr/>
-        </p:nvCxnSpPr>
-        <p:spPr>
-          <a:xfrm flipH="1">
-            <a:off x="1125346" y="3840872"/>
-            <a:ext cx="1306590" cy="381957"/>
           </a:xfrm>
           <a:prstGeom prst="line">
             <a:avLst/>

</xml_diff>